<commit_message>
Merged completed sections into final draft
</commit_message>
<xml_diff>
--- a/FINAL/Final Draft 1.pptx
+++ b/FINAL/Final Draft 1.pptx
@@ -127,6 +127,75 @@
 </p:presentation>
 </file>
 
+<file path=ppt/revisionInfo.xml><?xml version="1.0" encoding="utf-8"?>
+<p1510:revInfo xmlns:a="http://schemas.openxmlformats.org/drawingml/2006/main" xmlns:r="http://schemas.openxmlformats.org/officeDocument/2006/relationships" xmlns:p1510="http://schemas.microsoft.com/office/powerpoint/2015/10/main">
+  <p1510:revLst>
+    <p1510:client id="{744CA106-ED33-4578-A16B-EC2AD02A91F7}" v="4" dt="2019-02-15T09:57:24.515"/>
+  </p1510:revLst>
+</p1510:revInfo>
+</file>
+
+<file path=ppt/changesInfos/changesInfo1.xml><?xml version="1.0" encoding="utf-8"?>
+<pc:chgInfo xmlns:a="http://schemas.openxmlformats.org/drawingml/2006/main" xmlns:r="http://schemas.openxmlformats.org/officeDocument/2006/relationships" xmlns:ac="http://schemas.microsoft.com/office/drawing/2013/main/command" xmlns:pc="http://schemas.microsoft.com/office/powerpoint/2013/main/command">
+  <pc:docChgLst>
+    <pc:chgData name="Euan Ferguson" userId="d3d78bc380f84dea" providerId="LiveId" clId="{744CA106-ED33-4578-A16B-EC2AD02A91F7}"/>
+    <pc:docChg chg="custSel modSld sldOrd">
+      <pc:chgData name="Euan Ferguson" userId="d3d78bc380f84dea" providerId="LiveId" clId="{744CA106-ED33-4578-A16B-EC2AD02A91F7}" dt="2019-02-15T09:57:24.515" v="106"/>
+      <pc:docMkLst>
+        <pc:docMk/>
+      </pc:docMkLst>
+      <pc:sldChg chg="addSp modSp ord">
+        <pc:chgData name="Euan Ferguson" userId="d3d78bc380f84dea" providerId="LiveId" clId="{744CA106-ED33-4578-A16B-EC2AD02A91F7}" dt="2019-02-15T09:57:24.515" v="106"/>
+        <pc:sldMkLst>
+          <pc:docMk/>
+          <pc:sldMk cId="1955048285" sldId="273"/>
+        </pc:sldMkLst>
+        <pc:graphicFrameChg chg="modGraphic">
+          <ac:chgData name="Euan Ferguson" userId="d3d78bc380f84dea" providerId="LiveId" clId="{744CA106-ED33-4578-A16B-EC2AD02A91F7}" dt="2019-02-15T09:52:36.779" v="90" actId="20577"/>
+          <ac:graphicFrameMkLst>
+            <pc:docMk/>
+            <pc:sldMk cId="1955048285" sldId="273"/>
+            <ac:graphicFrameMk id="2" creationId="{D8EFD306-7A06-FD45-9739-DD1BBDBA7E8F}"/>
+          </ac:graphicFrameMkLst>
+        </pc:graphicFrameChg>
+        <pc:graphicFrameChg chg="modGraphic">
+          <ac:chgData name="Euan Ferguson" userId="d3d78bc380f84dea" providerId="LiveId" clId="{744CA106-ED33-4578-A16B-EC2AD02A91F7}" dt="2019-02-15T09:52:28.787" v="81" actId="20577"/>
+          <ac:graphicFrameMkLst>
+            <pc:docMk/>
+            <pc:sldMk cId="1955048285" sldId="273"/>
+            <ac:graphicFrameMk id="5" creationId="{36F7FE76-6F0C-064F-AAC9-79FC4C1EF38F}"/>
+          </ac:graphicFrameMkLst>
+        </pc:graphicFrameChg>
+        <pc:graphicFrameChg chg="modGraphic">
+          <ac:chgData name="Euan Ferguson" userId="d3d78bc380f84dea" providerId="LiveId" clId="{744CA106-ED33-4578-A16B-EC2AD02A91F7}" dt="2019-02-15T09:52:47.057" v="99" actId="20577"/>
+          <ac:graphicFrameMkLst>
+            <pc:docMk/>
+            <pc:sldMk cId="1955048285" sldId="273"/>
+            <ac:graphicFrameMk id="7" creationId="{993FB27C-77CC-9C47-8E8C-3F6FD0237F25}"/>
+          </ac:graphicFrameMkLst>
+        </pc:graphicFrameChg>
+        <pc:graphicFrameChg chg="modGraphic">
+          <ac:chgData name="Euan Ferguson" userId="d3d78bc380f84dea" providerId="LiveId" clId="{744CA106-ED33-4578-A16B-EC2AD02A91F7}" dt="2019-02-15T09:51:31.036" v="60" actId="20577"/>
+          <ac:graphicFrameMkLst>
+            <pc:docMk/>
+            <pc:sldMk cId="1955048285" sldId="273"/>
+            <ac:graphicFrameMk id="9" creationId="{866B5783-DE96-B546-A6A8-C56C652D6E7A}"/>
+          </ac:graphicFrameMkLst>
+        </pc:graphicFrameChg>
+        <pc:picChg chg="add mod modCrop">
+          <ac:chgData name="Euan Ferguson" userId="d3d78bc380f84dea" providerId="LiveId" clId="{744CA106-ED33-4578-A16B-EC2AD02A91F7}" dt="2019-02-15T09:54:57.556" v="105" actId="1076"/>
+          <ac:picMkLst>
+            <pc:docMk/>
+            <pc:sldMk cId="1955048285" sldId="273"/>
+            <ac:picMk id="12" creationId="{9271C0E0-5403-4B54-94EF-B15944B53703}"/>
+          </ac:picMkLst>
+        </pc:picChg>
+      </pc:sldChg>
+    </pc:docChg>
+  </pc:docChgLst>
+</pc:chgInfo>
+</file>
+
 <file path=ppt/slideLayouts/slideLayout1.xml><?xml version="1.0" encoding="utf-8"?>
 <p:sldLayout xmlns:a="http://schemas.openxmlformats.org/drawingml/2006/main" xmlns:r="http://schemas.openxmlformats.org/officeDocument/2006/relationships" xmlns:p="http://schemas.openxmlformats.org/presentationml/2006/main" type="title" preserve="1">
   <p:cSld name="Title Slide">
@@ -276,7 +345,7 @@
           <a:p>
             <a:fld id="{8B1F6BEF-6D8B-4DEB-9E20-05E468EF1E47}" type="datetimeFigureOut">
               <a:rPr lang="en-GB" smtClean="0"/>
-              <a:t>14/02/2019</a:t>
+              <a:t>15/02/2019</a:t>
             </a:fld>
             <a:endParaRPr lang="en-GB" dirty="0"/>
           </a:p>
@@ -476,7 +545,7 @@
           <a:p>
             <a:fld id="{8B1F6BEF-6D8B-4DEB-9E20-05E468EF1E47}" type="datetimeFigureOut">
               <a:rPr lang="en-GB" smtClean="0"/>
-              <a:t>14/02/2019</a:t>
+              <a:t>15/02/2019</a:t>
             </a:fld>
             <a:endParaRPr lang="en-GB" dirty="0"/>
           </a:p>
@@ -686,7 +755,7 @@
           <a:p>
             <a:fld id="{8B1F6BEF-6D8B-4DEB-9E20-05E468EF1E47}" type="datetimeFigureOut">
               <a:rPr lang="en-GB" smtClean="0"/>
-              <a:t>14/02/2019</a:t>
+              <a:t>15/02/2019</a:t>
             </a:fld>
             <a:endParaRPr lang="en-GB" dirty="0"/>
           </a:p>
@@ -886,7 +955,7 @@
           <a:p>
             <a:fld id="{8B1F6BEF-6D8B-4DEB-9E20-05E468EF1E47}" type="datetimeFigureOut">
               <a:rPr lang="en-GB" smtClean="0"/>
-              <a:t>14/02/2019</a:t>
+              <a:t>15/02/2019</a:t>
             </a:fld>
             <a:endParaRPr lang="en-GB" dirty="0"/>
           </a:p>
@@ -1162,7 +1231,7 @@
           <a:p>
             <a:fld id="{8B1F6BEF-6D8B-4DEB-9E20-05E468EF1E47}" type="datetimeFigureOut">
               <a:rPr lang="en-GB" smtClean="0"/>
-              <a:t>14/02/2019</a:t>
+              <a:t>15/02/2019</a:t>
             </a:fld>
             <a:endParaRPr lang="en-GB" dirty="0"/>
           </a:p>
@@ -1430,7 +1499,7 @@
           <a:p>
             <a:fld id="{8B1F6BEF-6D8B-4DEB-9E20-05E468EF1E47}" type="datetimeFigureOut">
               <a:rPr lang="en-GB" smtClean="0"/>
-              <a:t>14/02/2019</a:t>
+              <a:t>15/02/2019</a:t>
             </a:fld>
             <a:endParaRPr lang="en-GB" dirty="0"/>
           </a:p>
@@ -1845,7 +1914,7 @@
           <a:p>
             <a:fld id="{8B1F6BEF-6D8B-4DEB-9E20-05E468EF1E47}" type="datetimeFigureOut">
               <a:rPr lang="en-GB" smtClean="0"/>
-              <a:t>14/02/2019</a:t>
+              <a:t>15/02/2019</a:t>
             </a:fld>
             <a:endParaRPr lang="en-GB" dirty="0"/>
           </a:p>
@@ -1987,7 +2056,7 @@
           <a:p>
             <a:fld id="{8B1F6BEF-6D8B-4DEB-9E20-05E468EF1E47}" type="datetimeFigureOut">
               <a:rPr lang="en-GB" smtClean="0"/>
-              <a:t>14/02/2019</a:t>
+              <a:t>15/02/2019</a:t>
             </a:fld>
             <a:endParaRPr lang="en-GB" dirty="0"/>
           </a:p>
@@ -2100,7 +2169,7 @@
           <a:p>
             <a:fld id="{8B1F6BEF-6D8B-4DEB-9E20-05E468EF1E47}" type="datetimeFigureOut">
               <a:rPr lang="en-GB" smtClean="0"/>
-              <a:t>14/02/2019</a:t>
+              <a:t>15/02/2019</a:t>
             </a:fld>
             <a:endParaRPr lang="en-GB" dirty="0"/>
           </a:p>
@@ -2413,7 +2482,7 @@
           <a:p>
             <a:fld id="{8B1F6BEF-6D8B-4DEB-9E20-05E468EF1E47}" type="datetimeFigureOut">
               <a:rPr lang="en-GB" smtClean="0"/>
-              <a:t>14/02/2019</a:t>
+              <a:t>15/02/2019</a:t>
             </a:fld>
             <a:endParaRPr lang="en-GB" dirty="0"/>
           </a:p>
@@ -2702,7 +2771,7 @@
           <a:p>
             <a:fld id="{8B1F6BEF-6D8B-4DEB-9E20-05E468EF1E47}" type="datetimeFigureOut">
               <a:rPr lang="en-GB" smtClean="0"/>
-              <a:t>14/02/2019</a:t>
+              <a:t>15/02/2019</a:t>
             </a:fld>
             <a:endParaRPr lang="en-GB" dirty="0"/>
           </a:p>
@@ -2945,7 +3014,7 @@
           <a:p>
             <a:fld id="{8B1F6BEF-6D8B-4DEB-9E20-05E468EF1E47}" type="datetimeFigureOut">
               <a:rPr lang="en-GB" smtClean="0"/>
-              <a:t>14/02/2019</a:t>
+              <a:t>15/02/2019</a:t>
             </a:fld>
             <a:endParaRPr lang="en-GB" dirty="0"/>
           </a:p>
@@ -3941,14 +4010,14 @@
           <p:nvPr>
             <p:extLst>
               <p:ext uri="{D42A27DB-BD31-4B8C-83A1-F6EECF244321}">
-                <p14:modId xmlns:p14="http://schemas.microsoft.com/office/powerpoint/2010/main" val="2958654010"/>
+                <p14:modId xmlns:p14="http://schemas.microsoft.com/office/powerpoint/2010/main" val="1380432287"/>
               </p:ext>
             </p:extLst>
           </p:nvPr>
         </p:nvGraphicFramePr>
         <p:xfrm>
           <a:off x="6096000" y="3776005"/>
-          <a:ext cx="2824672" cy="1295400"/>
+          <a:ext cx="2260379" cy="1554480"/>
         </p:xfrm>
         <a:graphic>
           <a:graphicData uri="http://schemas.openxmlformats.org/drawingml/2006/table">
@@ -3957,7 +4026,7 @@
                 <a:tableStyleId>{74C1A8A3-306A-4EB7-A6B1-4F7E0EB9C5D6}</a:tableStyleId>
               </a:tblPr>
               <a:tblGrid>
-                <a:gridCol w="1412336">
+                <a:gridCol w="848043">
                   <a:extLst>
                     <a:ext uri="{9D8B030D-6E8A-4147-A177-3AD203B41FA5}">
                       <a16:colId xmlns:a16="http://schemas.microsoft.com/office/drawing/2014/main" val="734684168"/>
@@ -4012,7 +4081,7 @@
                     <a:lstStyle/>
                     <a:p>
                       <a:r>
-                        <a:rPr lang="en-GB" sz="1100" dirty="0"/>
+                        <a:rPr lang="en-GB" sz="1100" u="sng" dirty="0"/>
                         <a:t>id</a:t>
                       </a:r>
                     </a:p>
@@ -4026,7 +4095,7 @@
                     <a:p>
                       <a:r>
                         <a:rPr lang="en-GB" sz="1100" dirty="0"/>
-                        <a:t>Integer</a:t>
+                        <a:t>Integer (PK)</a:t>
                       </a:r>
                     </a:p>
                   </a:txBody>
@@ -4137,6 +4206,39 @@
                   </a:ext>
                 </a:extLst>
               </a:tr>
+              <a:tr h="193635">
+                <a:tc>
+                  <a:txBody>
+                    <a:bodyPr/>
+                    <a:lstStyle/>
+                    <a:p>
+                      <a:r>
+                        <a:rPr lang="en-GB" sz="1100" u="dotted" baseline="0" dirty="0"/>
+                        <a:t>user_id</a:t>
+                      </a:r>
+                    </a:p>
+                  </a:txBody>
+                  <a:tcPr/>
+                </a:tc>
+                <a:tc>
+                  <a:txBody>
+                    <a:bodyPr/>
+                    <a:lstStyle/>
+                    <a:p>
+                      <a:r>
+                        <a:rPr lang="en-GB" sz="1100" dirty="0"/>
+                        <a:t>Integer (FK)</a:t>
+                      </a:r>
+                    </a:p>
+                  </a:txBody>
+                  <a:tcPr/>
+                </a:tc>
+                <a:extLst>
+                  <a:ext uri="{0D108BD9-81ED-4DB2-BD59-A6C34878D82A}">
+                    <a16:rowId xmlns:a16="http://schemas.microsoft.com/office/drawing/2014/main" val="1888938708"/>
+                  </a:ext>
+                </a:extLst>
+              </a:tr>
             </a:tbl>
           </a:graphicData>
         </a:graphic>
@@ -4192,14 +4294,14 @@
           <p:nvPr>
             <p:extLst>
               <p:ext uri="{D42A27DB-BD31-4B8C-83A1-F6EECF244321}">
-                <p14:modId xmlns:p14="http://schemas.microsoft.com/office/powerpoint/2010/main" val="2810984696"/>
+                <p14:modId xmlns:p14="http://schemas.microsoft.com/office/powerpoint/2010/main" val="3990330243"/>
               </p:ext>
             </p:extLst>
           </p:nvPr>
         </p:nvGraphicFramePr>
         <p:xfrm>
           <a:off x="9200552" y="407390"/>
-          <a:ext cx="2824672" cy="2849880"/>
+          <a:ext cx="2824672" cy="2590800"/>
         </p:xfrm>
         <a:graphic>
           <a:graphicData uri="http://schemas.openxmlformats.org/drawingml/2006/table">
@@ -4263,7 +4365,7 @@
                     <a:lstStyle/>
                     <a:p>
                       <a:r>
-                        <a:rPr lang="en-GB" sz="1100" dirty="0"/>
+                        <a:rPr lang="en-GB" sz="1100" u="sng" dirty="0"/>
                         <a:t>id</a:t>
                       </a:r>
                     </a:p>
@@ -4277,7 +4379,7 @@
                     <a:p>
                       <a:r>
                         <a:rPr lang="en-GB" sz="1100" dirty="0"/>
-                        <a:t>Integer</a:t>
+                        <a:t>Integer (PK)</a:t>
                       </a:r>
                     </a:p>
                   </a:txBody>
@@ -4362,7 +4464,7 @@
                     <a:lstStyle/>
                     <a:p>
                       <a:r>
-                        <a:rPr lang="en-GB" sz="1100" dirty="0"/>
+                        <a:rPr lang="en-GB" sz="1100" u="dotted" baseline="0" dirty="0"/>
                         <a:t>answered</a:t>
                       </a:r>
                     </a:p>
@@ -4376,7 +4478,7 @@
                     <a:p>
                       <a:r>
                         <a:rPr lang="en-GB" sz="1100" dirty="0"/>
-                        <a:t>FK check notation</a:t>
+                        <a:t>Integer (FK)</a:t>
                       </a:r>
                     </a:p>
                   </a:txBody>
@@ -4462,7 +4564,7 @@
                     <a:p>
                       <a:r>
                         <a:rPr lang="en-GB" sz="1100" dirty="0"/>
-                        <a:t>likes</a:t>
+                        <a:t>views</a:t>
                       </a:r>
                     </a:p>
                   </a:txBody>
@@ -4494,8 +4596,8 @@
                     <a:lstStyle/>
                     <a:p>
                       <a:r>
-                        <a:rPr lang="en-GB" sz="1100" dirty="0"/>
-                        <a:t>dislikes</a:t>
+                        <a:rPr lang="en-GB" sz="1100" u="dotted" baseline="0" dirty="0"/>
+                        <a:t>user_id</a:t>
                       </a:r>
                     </a:p>
                   </a:txBody>
@@ -4508,41 +4610,7 @@
                     <a:p>
                       <a:r>
                         <a:rPr lang="en-GB" sz="1100" dirty="0"/>
-                        <a:t>Integer</a:t>
-                      </a:r>
-                    </a:p>
-                  </a:txBody>
-                  <a:tcPr/>
-                </a:tc>
-                <a:extLst>
-                  <a:ext uri="{0D108BD9-81ED-4DB2-BD59-A6C34878D82A}">
-                    <a16:rowId xmlns:a16="http://schemas.microsoft.com/office/drawing/2014/main" val="903016933"/>
-                  </a:ext>
-                </a:extLst>
-              </a:tr>
-              <a:tr h="193635">
-                <a:tc>
-                  <a:txBody>
-                    <a:bodyPr/>
-                    <a:lstStyle/>
-                    <a:p>
-                      <a:r>
-                        <a:rPr lang="en-GB" sz="1100" dirty="0" err="1"/>
-                        <a:t>user_id</a:t>
-                      </a:r>
-                      <a:endParaRPr lang="en-GB" sz="1100" dirty="0"/>
-                    </a:p>
-                  </a:txBody>
-                  <a:tcPr/>
-                </a:tc>
-                <a:tc>
-                  <a:txBody>
-                    <a:bodyPr/>
-                    <a:lstStyle/>
-                    <a:p>
-                      <a:r>
-                        <a:rPr lang="en-GB" sz="1100" dirty="0"/>
-                        <a:t>Integer FK</a:t>
+                        <a:t>Integer (FK)</a:t>
                       </a:r>
                     </a:p>
                   </a:txBody>
@@ -4561,10 +4629,9 @@
                     <a:lstStyle/>
                     <a:p>
                       <a:r>
-                        <a:rPr lang="en-GB" sz="1100" dirty="0" err="1"/>
+                        <a:rPr lang="en-GB" sz="1100" u="dotted" baseline="0" dirty="0"/>
                         <a:t>category_id</a:t>
                       </a:r>
-                      <a:endParaRPr lang="en-GB" sz="1100" dirty="0"/>
                     </a:p>
                   </a:txBody>
                   <a:tcPr/>
@@ -4576,7 +4643,7 @@
                     <a:p>
                       <a:r>
                         <a:rPr lang="en-GB" sz="1100" dirty="0"/>
-                        <a:t>Integer FK</a:t>
+                        <a:t>Integer (FK)</a:t>
                       </a:r>
                     </a:p>
                   </a:txBody>
@@ -4643,7 +4710,7 @@
           <p:nvPr>
             <p:extLst>
               <p:ext uri="{D42A27DB-BD31-4B8C-83A1-F6EECF244321}">
-                <p14:modId xmlns:p14="http://schemas.microsoft.com/office/powerpoint/2010/main" val="1919410220"/>
+                <p14:modId xmlns:p14="http://schemas.microsoft.com/office/powerpoint/2010/main" val="1704459924"/>
               </p:ext>
             </p:extLst>
           </p:nvPr>
@@ -4714,7 +4781,7 @@
                     <a:lstStyle/>
                     <a:p>
                       <a:r>
-                        <a:rPr lang="en-GB" sz="1100" dirty="0"/>
+                        <a:rPr lang="en-GB" sz="1100" u="sng" dirty="0"/>
                         <a:t>id</a:t>
                       </a:r>
                     </a:p>
@@ -4728,7 +4795,7 @@
                     <a:p>
                       <a:r>
                         <a:rPr lang="en-GB" sz="1100" dirty="0"/>
-                        <a:t>Integer</a:t>
+                        <a:t>Integer (PK)</a:t>
                       </a:r>
                     </a:p>
                   </a:txBody>
@@ -4879,10 +4946,9 @@
                     <a:lstStyle/>
                     <a:p>
                       <a:r>
-                        <a:rPr lang="en-GB" sz="1100" dirty="0" err="1"/>
+                        <a:rPr lang="en-GB" sz="1100" u="dotted" baseline="0" dirty="0"/>
                         <a:t>user_id</a:t>
                       </a:r>
-                      <a:endParaRPr lang="en-GB" sz="1100" dirty="0"/>
                     </a:p>
                   </a:txBody>
                   <a:tcPr/>
@@ -4894,7 +4960,7 @@
                     <a:p>
                       <a:r>
                         <a:rPr lang="en-GB" sz="1100" dirty="0"/>
-                        <a:t>Integer FK</a:t>
+                        <a:t>Integer (FK)</a:t>
                       </a:r>
                     </a:p>
                   </a:txBody>
@@ -4913,10 +4979,9 @@
                     <a:lstStyle/>
                     <a:p>
                       <a:r>
-                        <a:rPr lang="en-GB" sz="1100" dirty="0" err="1"/>
+                        <a:rPr lang="en-GB" sz="1100" u="dotted" baseline="0" dirty="0"/>
                         <a:t>category_id</a:t>
                       </a:r>
-                      <a:endParaRPr lang="en-GB" sz="1100" dirty="0"/>
                     </a:p>
                   </a:txBody>
                   <a:tcPr/>
@@ -4928,7 +4993,7 @@
                     <a:p>
                       <a:r>
                         <a:rPr lang="en-GB" sz="1100" dirty="0"/>
-                        <a:t>Integer FK</a:t>
+                        <a:t>Integer (FK)</a:t>
                       </a:r>
                     </a:p>
                   </a:txBody>
@@ -4995,14 +5060,14 @@
           <p:nvPr>
             <p:extLst>
               <p:ext uri="{D42A27DB-BD31-4B8C-83A1-F6EECF244321}">
-                <p14:modId xmlns:p14="http://schemas.microsoft.com/office/powerpoint/2010/main" val="1225849168"/>
+                <p14:modId xmlns:p14="http://schemas.microsoft.com/office/powerpoint/2010/main" val="1512962992"/>
               </p:ext>
             </p:extLst>
           </p:nvPr>
         </p:nvGraphicFramePr>
         <p:xfrm>
           <a:off x="6083537" y="407390"/>
-          <a:ext cx="2824672" cy="2849880"/>
+          <a:ext cx="2824672" cy="2590800"/>
         </p:xfrm>
         <a:graphic>
           <a:graphicData uri="http://schemas.openxmlformats.org/drawingml/2006/table">
@@ -5066,7 +5131,7 @@
                     <a:lstStyle/>
                     <a:p>
                       <a:r>
-                        <a:rPr lang="en-GB" sz="1100" dirty="0"/>
+                        <a:rPr lang="en-GB" sz="1100" u="sng" dirty="0"/>
                         <a:t>id</a:t>
                       </a:r>
                     </a:p>
@@ -5080,7 +5145,7 @@
                     <a:p>
                       <a:r>
                         <a:rPr lang="en-GB" sz="1100" dirty="0"/>
-                        <a:t>Integer</a:t>
+                        <a:t>Integer (PK)</a:t>
                       </a:r>
                     </a:p>
                   </a:txBody>
@@ -5360,33 +5425,6 @@
                   </a:ext>
                 </a:extLst>
               </a:tr>
-              <a:tr h="193635">
-                <a:tc>
-                  <a:txBody>
-                    <a:bodyPr/>
-                    <a:lstStyle/>
-                    <a:p>
-                      <a:endParaRPr lang="en-GB" sz="1100" dirty="0"/>
-                    </a:p>
-                  </a:txBody>
-                  <a:tcPr/>
-                </a:tc>
-                <a:tc>
-                  <a:txBody>
-                    <a:bodyPr/>
-                    <a:lstStyle/>
-                    <a:p>
-                      <a:endParaRPr lang="en-GB" sz="1100" dirty="0"/>
-                    </a:p>
-                  </a:txBody>
-                  <a:tcPr/>
-                </a:tc>
-                <a:extLst>
-                  <a:ext uri="{0D108BD9-81ED-4DB2-BD59-A6C34878D82A}">
-                    <a16:rowId xmlns:a16="http://schemas.microsoft.com/office/drawing/2014/main" val="3780136870"/>
-                  </a:ext>
-                </a:extLst>
-              </a:tr>
             </a:tbl>
           </a:graphicData>
         </a:graphic>
@@ -5427,6 +5465,41 @@
           </a:p>
         </p:txBody>
       </p:sp>
+      <p:pic>
+        <p:nvPicPr>
+          <p:cNvPr id="12" name="Picture 11">
+            <a:extLst>
+              <a:ext uri="{FF2B5EF4-FFF2-40B4-BE49-F238E27FC236}">
+                <a16:creationId xmlns:a16="http://schemas.microsoft.com/office/drawing/2014/main" id="{9271C0E0-5403-4B54-94EF-B15944B53703}"/>
+              </a:ext>
+            </a:extLst>
+          </p:cNvPr>
+          <p:cNvPicPr>
+            <a:picLocks noChangeAspect="1"/>
+          </p:cNvPicPr>
+          <p:nvPr/>
+        </p:nvPicPr>
+        <p:blipFill rotWithShape="1">
+          <a:blip r:embed="rId2">
+            <a:extLst>
+              <a:ext uri="{28A0092B-C50C-407E-A947-70E740481C1C}">
+                <a14:useLocalDpi xmlns:a14="http://schemas.microsoft.com/office/drawing/2010/main" val="0"/>
+              </a:ext>
+            </a:extLst>
+          </a:blip>
+          <a:srcRect l="18073" t="17697" r="6780" b="42682"/>
+          <a:stretch/>
+        </p:blipFill>
+        <p:spPr>
+          <a:xfrm>
+            <a:off x="160172" y="1973564"/>
+            <a:ext cx="5726151" cy="2332296"/>
+          </a:xfrm>
+          <a:prstGeom prst="rect">
+            <a:avLst/>
+          </a:prstGeom>
+        </p:spPr>
+      </p:pic>
     </p:spTree>
     <p:extLst>
       <p:ext uri="{BB962C8B-B14F-4D97-AF65-F5344CB8AC3E}">

</xml_diff>